<commit_message>
Securing User Authentication Process
</commit_message>
<xml_diff>
--- a/Presentation.pptx
+++ b/Presentation.pptx
@@ -5,7 +5,7 @@
     <p:sldMasterId id="2147483712" r:id="rId4"/>
   </p:sldMasterIdLst>
   <p:notesMasterIdLst>
-    <p:notesMasterId r:id="rId15"/>
+    <p:notesMasterId r:id="rId26"/>
   </p:notesMasterIdLst>
   <p:sldIdLst>
     <p:sldId id="257" r:id="rId5"/>
@@ -18,6 +18,17 @@
     <p:sldId id="265" r:id="rId12"/>
     <p:sldId id="266" r:id="rId13"/>
     <p:sldId id="267" r:id="rId14"/>
+    <p:sldId id="268" r:id="rId15"/>
+    <p:sldId id="269" r:id="rId16"/>
+    <p:sldId id="270" r:id="rId17"/>
+    <p:sldId id="271" r:id="rId18"/>
+    <p:sldId id="272" r:id="rId19"/>
+    <p:sldId id="273" r:id="rId20"/>
+    <p:sldId id="274" r:id="rId21"/>
+    <p:sldId id="275" r:id="rId22"/>
+    <p:sldId id="276" r:id="rId23"/>
+    <p:sldId id="277" r:id="rId24"/>
+    <p:sldId id="278" r:id="rId25"/>
   </p:sldIdLst>
   <p:sldSz cx="12192000" cy="6858000"/>
   <p:notesSz cx="6858000" cy="9144000"/>
@@ -206,7 +217,7 @@
           <a:p>
             <a:fld id="{DA7AB520-F7AE-4F48-9518-440720A86629}" type="datetimeFigureOut">
               <a:rPr lang="en-US" smtClean="0"/>
-              <a:t>11/29/2021</a:t>
+              <a:t>12/1/2021</a:t>
             </a:fld>
             <a:endParaRPr lang="en-US"/>
           </a:p>
@@ -806,7 +817,7 @@
           <a:p>
             <a:fld id="{ED291B17-9318-49DB-B28B-6E5994AE9581}" type="datetime1">
               <a:rPr lang="en-US" smtClean="0"/>
-              <a:t>11/29/2021</a:t>
+              <a:t>12/1/2021</a:t>
             </a:fld>
             <a:endParaRPr lang="en-US" dirty="0"/>
           </a:p>
@@ -1009,7 +1020,7 @@
           <a:p>
             <a:fld id="{2CED4963-E985-44C4-B8C4-FDD613B7C2F8}" type="datetime1">
               <a:rPr lang="en-US" smtClean="0"/>
-              <a:t>11/29/2021</a:t>
+              <a:t>12/1/2021</a:t>
             </a:fld>
             <a:endParaRPr lang="en-US" dirty="0"/>
           </a:p>
@@ -1371,7 +1382,7 @@
           <a:p>
             <a:fld id="{ED291B17-9318-49DB-B28B-6E5994AE9581}" type="datetime1">
               <a:rPr lang="en-US" smtClean="0"/>
-              <a:t>11/29/2021</a:t>
+              <a:t>12/1/2021</a:t>
             </a:fld>
             <a:endParaRPr lang="en-US" dirty="0"/>
           </a:p>
@@ -1569,7 +1580,7 @@
           <a:p>
             <a:fld id="{78DD82B9-B8EE-4375-B6FF-88FA6ABB15D9}" type="datetime1">
               <a:rPr lang="en-US" smtClean="0"/>
-              <a:t>11/29/2021</a:t>
+              <a:t>12/1/2021</a:t>
             </a:fld>
             <a:endParaRPr lang="en-US" dirty="0"/>
           </a:p>
@@ -1881,7 +1892,7 @@
           <a:p>
             <a:fld id="{B2497495-0637-405E-AE64-5CC7506D51F5}" type="datetime1">
               <a:rPr lang="en-US" smtClean="0"/>
-              <a:t>11/29/2021</a:t>
+              <a:t>12/1/2021</a:t>
             </a:fld>
             <a:endParaRPr lang="en-US" dirty="0"/>
           </a:p>
@@ -2134,7 +2145,7 @@
           <a:p>
             <a:fld id="{7BFFD690-9426-415D-8B65-26881E07B2D4}" type="datetime1">
               <a:rPr lang="en-US" smtClean="0"/>
-              <a:t>11/29/2021</a:t>
+              <a:t>12/1/2021</a:t>
             </a:fld>
             <a:endParaRPr lang="en-US" dirty="0"/>
           </a:p>
@@ -2556,7 +2567,7 @@
           <a:p>
             <a:fld id="{04C4989A-474C-40DE-95B9-011C28B71673}" type="datetime1">
               <a:rPr lang="en-US" smtClean="0"/>
-              <a:t>11/29/2021</a:t>
+              <a:t>12/1/2021</a:t>
             </a:fld>
             <a:endParaRPr lang="en-US" dirty="0"/>
           </a:p>
@@ -2679,7 +2690,7 @@
           <a:p>
             <a:fld id="{5DB4ED54-5B5E-4A04-93D3-5772E3CE3818}" type="datetime1">
               <a:rPr lang="en-US" smtClean="0"/>
-              <a:t>11/29/2021</a:t>
+              <a:t>12/1/2021</a:t>
             </a:fld>
             <a:endParaRPr lang="en-US" dirty="0"/>
           </a:p>
@@ -2774,7 +2785,7 @@
           <a:p>
             <a:fld id="{4EDE50D6-574B-40AF-946F-D52A04ADE379}" type="datetime1">
               <a:rPr lang="en-US" smtClean="0"/>
-              <a:t>11/29/2021</a:t>
+              <a:t>12/1/2021</a:t>
             </a:fld>
             <a:endParaRPr lang="en-US" dirty="0"/>
           </a:p>
@@ -3151,7 +3162,7 @@
           <a:p>
             <a:fld id="{D82884F1-FFEA-405F-9602-3DCA865EDA4E}" type="datetime1">
               <a:rPr lang="en-US" smtClean="0"/>
-              <a:t>11/29/2021</a:t>
+              <a:t>12/1/2021</a:t>
             </a:fld>
             <a:endParaRPr lang="en-US" dirty="0"/>
           </a:p>
@@ -3444,7 +3455,7 @@
           <a:p>
             <a:fld id="{7E18DB4A-8810-4A10-AD5C-D5E2C667F5B3}" type="datetime1">
               <a:rPr lang="en-US" smtClean="0"/>
-              <a:t>11/29/2021</a:t>
+              <a:t>12/1/2021</a:t>
             </a:fld>
             <a:endParaRPr lang="en-US" dirty="0"/>
           </a:p>
@@ -3659,7 +3670,7 @@
           <a:p>
             <a:fld id="{ED291B17-9318-49DB-B28B-6E5994AE9581}" type="datetime1">
               <a:rPr lang="en-US" smtClean="0"/>
-              <a:t>11/29/2021</a:t>
+              <a:t>12/1/2021</a:t>
             </a:fld>
             <a:endParaRPr lang="en-US" dirty="0"/>
           </a:p>
@@ -4735,6 +4746,817 @@
 </p:sld>
 </file>
 
+<file path=ppt/slides/slide11.xml><?xml version="1.0" encoding="utf-8"?>
+<p:sld xmlns:a="http://schemas.openxmlformats.org/drawingml/2006/main" xmlns:r="http://schemas.openxmlformats.org/officeDocument/2006/relationships" xmlns:p="http://schemas.openxmlformats.org/presentationml/2006/main">
+  <p:cSld>
+    <p:spTree>
+      <p:nvGrpSpPr>
+        <p:cNvPr id="1" name=""/>
+        <p:cNvGrpSpPr/>
+        <p:nvPr/>
+      </p:nvGrpSpPr>
+      <p:grpSpPr>
+        <a:xfrm>
+          <a:off x="0" y="0"/>
+          <a:ext cx="0" cy="0"/>
+          <a:chOff x="0" y="0"/>
+          <a:chExt cx="0" cy="0"/>
+        </a:xfrm>
+      </p:grpSpPr>
+      <p:sp>
+        <p:nvSpPr>
+          <p:cNvPr id="2" name="Title 1">
+            <a:extLst>
+              <a:ext uri="{FF2B5EF4-FFF2-40B4-BE49-F238E27FC236}">
+                <a16:creationId xmlns:a16="http://schemas.microsoft.com/office/drawing/2014/main" id="{6D2336DA-A5AF-48E5-B540-3EDC6372CC08}"/>
+              </a:ext>
+            </a:extLst>
+          </p:cNvPr>
+          <p:cNvSpPr>
+            <a:spLocks noGrp="1"/>
+          </p:cNvSpPr>
+          <p:nvPr>
+            <p:ph type="title"/>
+          </p:nvPr>
+        </p:nvSpPr>
+        <p:spPr>
+          <a:xfrm>
+            <a:off x="2595188" y="2893671"/>
+            <a:ext cx="7532660" cy="675534"/>
+          </a:xfrm>
+        </p:spPr>
+        <p:txBody>
+          <a:bodyPr/>
+          <a:lstStyle/>
+          <a:p>
+            <a:r>
+              <a:rPr lang="en-US" dirty="0"/>
+              <a:t>Securing user authentication process</a:t>
+            </a:r>
+          </a:p>
+        </p:txBody>
+      </p:sp>
+    </p:spTree>
+    <p:extLst>
+      <p:ext uri="{BB962C8B-B14F-4D97-AF65-F5344CB8AC3E}">
+        <p14:creationId xmlns:p14="http://schemas.microsoft.com/office/powerpoint/2010/main" val="2985731549"/>
+      </p:ext>
+    </p:extLst>
+  </p:cSld>
+  <p:clrMapOvr>
+    <a:masterClrMapping/>
+  </p:clrMapOvr>
+</p:sld>
+</file>
+
+<file path=ppt/slides/slide12.xml><?xml version="1.0" encoding="utf-8"?>
+<p:sld xmlns:a="http://schemas.openxmlformats.org/drawingml/2006/main" xmlns:r="http://schemas.openxmlformats.org/officeDocument/2006/relationships" xmlns:p="http://schemas.openxmlformats.org/presentationml/2006/main">
+  <p:cSld>
+    <p:spTree>
+      <p:nvGrpSpPr>
+        <p:cNvPr id="1" name=""/>
+        <p:cNvGrpSpPr/>
+        <p:nvPr/>
+      </p:nvGrpSpPr>
+      <p:grpSpPr>
+        <a:xfrm>
+          <a:off x="0" y="0"/>
+          <a:ext cx="0" cy="0"/>
+          <a:chOff x="0" y="0"/>
+          <a:chExt cx="0" cy="0"/>
+        </a:xfrm>
+      </p:grpSpPr>
+      <p:sp>
+        <p:nvSpPr>
+          <p:cNvPr id="2" name="Title 1">
+            <a:extLst>
+              <a:ext uri="{FF2B5EF4-FFF2-40B4-BE49-F238E27FC236}">
+                <a16:creationId xmlns:a16="http://schemas.microsoft.com/office/drawing/2014/main" id="{F3B616ED-D311-43EF-B2F1-2CDBAF50B3B4}"/>
+              </a:ext>
+            </a:extLst>
+          </p:cNvPr>
+          <p:cNvSpPr>
+            <a:spLocks noGrp="1"/>
+          </p:cNvSpPr>
+          <p:nvPr>
+            <p:ph type="title"/>
+          </p:nvPr>
+        </p:nvSpPr>
+        <p:spPr>
+          <a:xfrm>
+            <a:off x="581192" y="702156"/>
+            <a:ext cx="11029616" cy="536335"/>
+          </a:xfrm>
+        </p:spPr>
+        <p:txBody>
+          <a:bodyPr/>
+          <a:lstStyle/>
+          <a:p>
+            <a:r>
+              <a:rPr lang="en-US" dirty="0"/>
+              <a:t>Implicit grant</a:t>
+            </a:r>
+          </a:p>
+        </p:txBody>
+      </p:sp>
+      <p:pic>
+        <p:nvPicPr>
+          <p:cNvPr id="4" name="Picture 3">
+            <a:extLst>
+              <a:ext uri="{FF2B5EF4-FFF2-40B4-BE49-F238E27FC236}">
+                <a16:creationId xmlns:a16="http://schemas.microsoft.com/office/drawing/2014/main" id="{9F9B7D16-7D99-4522-A3E5-281E88548747}"/>
+              </a:ext>
+            </a:extLst>
+          </p:cNvPr>
+          <p:cNvPicPr>
+            <a:picLocks noChangeAspect="1"/>
+          </p:cNvPicPr>
+          <p:nvPr/>
+        </p:nvPicPr>
+        <p:blipFill>
+          <a:blip r:embed="rId2"/>
+          <a:stretch>
+            <a:fillRect/>
+          </a:stretch>
+        </p:blipFill>
+        <p:spPr>
+          <a:xfrm>
+            <a:off x="395287" y="1331089"/>
+            <a:ext cx="7743825" cy="5314105"/>
+          </a:xfrm>
+          <a:prstGeom prst="rect">
+            <a:avLst/>
+          </a:prstGeom>
+        </p:spPr>
+      </p:pic>
+    </p:spTree>
+    <p:extLst>
+      <p:ext uri="{BB962C8B-B14F-4D97-AF65-F5344CB8AC3E}">
+        <p14:creationId xmlns:p14="http://schemas.microsoft.com/office/powerpoint/2010/main" val="2550092439"/>
+      </p:ext>
+    </p:extLst>
+  </p:cSld>
+  <p:clrMapOvr>
+    <a:masterClrMapping/>
+  </p:clrMapOvr>
+</p:sld>
+</file>
+
+<file path=ppt/slides/slide13.xml><?xml version="1.0" encoding="utf-8"?>
+<p:sld xmlns:a="http://schemas.openxmlformats.org/drawingml/2006/main" xmlns:r="http://schemas.openxmlformats.org/officeDocument/2006/relationships" xmlns:p="http://schemas.openxmlformats.org/presentationml/2006/main">
+  <p:cSld>
+    <p:spTree>
+      <p:nvGrpSpPr>
+        <p:cNvPr id="1" name=""/>
+        <p:cNvGrpSpPr/>
+        <p:nvPr/>
+      </p:nvGrpSpPr>
+      <p:grpSpPr>
+        <a:xfrm>
+          <a:off x="0" y="0"/>
+          <a:ext cx="0" cy="0"/>
+          <a:chOff x="0" y="0"/>
+          <a:chExt cx="0" cy="0"/>
+        </a:xfrm>
+      </p:grpSpPr>
+      <p:sp>
+        <p:nvSpPr>
+          <p:cNvPr id="2" name="Title 1">
+            <a:extLst>
+              <a:ext uri="{FF2B5EF4-FFF2-40B4-BE49-F238E27FC236}">
+                <a16:creationId xmlns:a16="http://schemas.microsoft.com/office/drawing/2014/main" id="{8B99CB2E-2ABE-4B40-8DF3-0249700154EA}"/>
+              </a:ext>
+            </a:extLst>
+          </p:cNvPr>
+          <p:cNvSpPr>
+            <a:spLocks noGrp="1"/>
+          </p:cNvSpPr>
+          <p:nvPr>
+            <p:ph type="title"/>
+          </p:nvPr>
+        </p:nvSpPr>
+        <p:spPr>
+          <a:xfrm>
+            <a:off x="581192" y="702156"/>
+            <a:ext cx="11029616" cy="524760"/>
+          </a:xfrm>
+        </p:spPr>
+        <p:txBody>
+          <a:bodyPr/>
+          <a:lstStyle/>
+          <a:p>
+            <a:r>
+              <a:rPr lang="en-US" dirty="0"/>
+              <a:t>Inspect network</a:t>
+            </a:r>
+          </a:p>
+        </p:txBody>
+      </p:sp>
+      <p:pic>
+        <p:nvPicPr>
+          <p:cNvPr id="4" name="Picture 3">
+            <a:extLst>
+              <a:ext uri="{FF2B5EF4-FFF2-40B4-BE49-F238E27FC236}">
+                <a16:creationId xmlns:a16="http://schemas.microsoft.com/office/drawing/2014/main" id="{6091A555-CA95-41AD-BF45-A750AB258B97}"/>
+              </a:ext>
+            </a:extLst>
+          </p:cNvPr>
+          <p:cNvPicPr>
+            <a:picLocks noChangeAspect="1"/>
+          </p:cNvPicPr>
+          <p:nvPr/>
+        </p:nvPicPr>
+        <p:blipFill>
+          <a:blip r:embed="rId2"/>
+          <a:stretch>
+            <a:fillRect/>
+          </a:stretch>
+        </p:blipFill>
+        <p:spPr>
+          <a:xfrm>
+            <a:off x="0" y="1535534"/>
+            <a:ext cx="12192000" cy="4797706"/>
+          </a:xfrm>
+          <a:prstGeom prst="rect">
+            <a:avLst/>
+          </a:prstGeom>
+        </p:spPr>
+      </p:pic>
+    </p:spTree>
+    <p:extLst>
+      <p:ext uri="{BB962C8B-B14F-4D97-AF65-F5344CB8AC3E}">
+        <p14:creationId xmlns:p14="http://schemas.microsoft.com/office/powerpoint/2010/main" val="2878553571"/>
+      </p:ext>
+    </p:extLst>
+  </p:cSld>
+  <p:clrMapOvr>
+    <a:masterClrMapping/>
+  </p:clrMapOvr>
+</p:sld>
+</file>
+
+<file path=ppt/slides/slide14.xml><?xml version="1.0" encoding="utf-8"?>
+<p:sld xmlns:a="http://schemas.openxmlformats.org/drawingml/2006/main" xmlns:r="http://schemas.openxmlformats.org/officeDocument/2006/relationships" xmlns:p="http://schemas.openxmlformats.org/presentationml/2006/main">
+  <p:cSld>
+    <p:spTree>
+      <p:nvGrpSpPr>
+        <p:cNvPr id="1" name=""/>
+        <p:cNvGrpSpPr/>
+        <p:nvPr/>
+      </p:nvGrpSpPr>
+      <p:grpSpPr>
+        <a:xfrm>
+          <a:off x="0" y="0"/>
+          <a:ext cx="0" cy="0"/>
+          <a:chOff x="0" y="0"/>
+          <a:chExt cx="0" cy="0"/>
+        </a:xfrm>
+      </p:grpSpPr>
+      <p:sp>
+        <p:nvSpPr>
+          <p:cNvPr id="2" name="Title 1">
+            <a:extLst>
+              <a:ext uri="{FF2B5EF4-FFF2-40B4-BE49-F238E27FC236}">
+                <a16:creationId xmlns:a16="http://schemas.microsoft.com/office/drawing/2014/main" id="{FAFA1445-CA94-4628-89AC-A8127293107A}"/>
+              </a:ext>
+            </a:extLst>
+          </p:cNvPr>
+          <p:cNvSpPr>
+            <a:spLocks noGrp="1"/>
+          </p:cNvSpPr>
+          <p:nvPr>
+            <p:ph type="title"/>
+          </p:nvPr>
+        </p:nvSpPr>
+        <p:spPr>
+          <a:xfrm>
+            <a:off x="581192" y="702156"/>
+            <a:ext cx="11029616" cy="605783"/>
+          </a:xfrm>
+        </p:spPr>
+        <p:txBody>
+          <a:bodyPr/>
+          <a:lstStyle/>
+          <a:p>
+            <a:r>
+              <a:rPr lang="en-US" dirty="0"/>
+              <a:t>Authorization endpoint</a:t>
+            </a:r>
+          </a:p>
+        </p:txBody>
+      </p:sp>
+      <p:pic>
+        <p:nvPicPr>
+          <p:cNvPr id="4" name="Picture 3">
+            <a:extLst>
+              <a:ext uri="{FF2B5EF4-FFF2-40B4-BE49-F238E27FC236}">
+                <a16:creationId xmlns:a16="http://schemas.microsoft.com/office/drawing/2014/main" id="{2521CF21-116B-453C-B537-2ECB83B15AD8}"/>
+              </a:ext>
+            </a:extLst>
+          </p:cNvPr>
+          <p:cNvPicPr>
+            <a:picLocks noChangeAspect="1"/>
+          </p:cNvPicPr>
+          <p:nvPr/>
+        </p:nvPicPr>
+        <p:blipFill>
+          <a:blip r:embed="rId2"/>
+          <a:stretch>
+            <a:fillRect/>
+          </a:stretch>
+        </p:blipFill>
+        <p:spPr>
+          <a:xfrm>
+            <a:off x="104172" y="1412111"/>
+            <a:ext cx="12192000" cy="5445889"/>
+          </a:xfrm>
+          <a:prstGeom prst="rect">
+            <a:avLst/>
+          </a:prstGeom>
+        </p:spPr>
+      </p:pic>
+    </p:spTree>
+    <p:extLst>
+      <p:ext uri="{BB962C8B-B14F-4D97-AF65-F5344CB8AC3E}">
+        <p14:creationId xmlns:p14="http://schemas.microsoft.com/office/powerpoint/2010/main" val="369663823"/>
+      </p:ext>
+    </p:extLst>
+  </p:cSld>
+  <p:clrMapOvr>
+    <a:masterClrMapping/>
+  </p:clrMapOvr>
+</p:sld>
+</file>
+
+<file path=ppt/slides/slide15.xml><?xml version="1.0" encoding="utf-8"?>
+<p:sld xmlns:a="http://schemas.openxmlformats.org/drawingml/2006/main" xmlns:r="http://schemas.openxmlformats.org/officeDocument/2006/relationships" xmlns:p="http://schemas.openxmlformats.org/presentationml/2006/main">
+  <p:cSld>
+    <p:spTree>
+      <p:nvGrpSpPr>
+        <p:cNvPr id="1" name=""/>
+        <p:cNvGrpSpPr/>
+        <p:nvPr/>
+      </p:nvGrpSpPr>
+      <p:grpSpPr>
+        <a:xfrm>
+          <a:off x="0" y="0"/>
+          <a:ext cx="0" cy="0"/>
+          <a:chOff x="0" y="0"/>
+          <a:chExt cx="0" cy="0"/>
+        </a:xfrm>
+      </p:grpSpPr>
+      <p:sp>
+        <p:nvSpPr>
+          <p:cNvPr id="2" name="Title 1">
+            <a:extLst>
+              <a:ext uri="{FF2B5EF4-FFF2-40B4-BE49-F238E27FC236}">
+                <a16:creationId xmlns:a16="http://schemas.microsoft.com/office/drawing/2014/main" id="{0F785972-C7D0-44E2-B83E-B0D9B1931AFF}"/>
+              </a:ext>
+            </a:extLst>
+          </p:cNvPr>
+          <p:cNvSpPr>
+            <a:spLocks noGrp="1"/>
+          </p:cNvSpPr>
+          <p:nvPr>
+            <p:ph type="title"/>
+          </p:nvPr>
+        </p:nvSpPr>
+        <p:spPr>
+          <a:xfrm>
+            <a:off x="581192" y="702156"/>
+            <a:ext cx="11029616" cy="351140"/>
+          </a:xfrm>
+        </p:spPr>
+        <p:txBody>
+          <a:bodyPr>
+            <a:normAutofit fontScale="90000"/>
+          </a:bodyPr>
+          <a:lstStyle/>
+          <a:p>
+            <a:r>
+              <a:rPr lang="en-US" dirty="0"/>
+              <a:t>Name identifier from SUB</a:t>
+            </a:r>
+          </a:p>
+        </p:txBody>
+      </p:sp>
+      <p:pic>
+        <p:nvPicPr>
+          <p:cNvPr id="4" name="Picture 3">
+            <a:extLst>
+              <a:ext uri="{FF2B5EF4-FFF2-40B4-BE49-F238E27FC236}">
+                <a16:creationId xmlns:a16="http://schemas.microsoft.com/office/drawing/2014/main" id="{F8E33397-71AF-4502-B0AB-17A5AA88E540}"/>
+              </a:ext>
+            </a:extLst>
+          </p:cNvPr>
+          <p:cNvPicPr>
+            <a:picLocks noChangeAspect="1"/>
+          </p:cNvPicPr>
+          <p:nvPr/>
+        </p:nvPicPr>
+        <p:blipFill>
+          <a:blip r:embed="rId2"/>
+          <a:stretch>
+            <a:fillRect/>
+          </a:stretch>
+        </p:blipFill>
+        <p:spPr>
+          <a:xfrm>
+            <a:off x="177969" y="1169043"/>
+            <a:ext cx="11164730" cy="5688957"/>
+          </a:xfrm>
+          <a:prstGeom prst="rect">
+            <a:avLst/>
+          </a:prstGeom>
+        </p:spPr>
+      </p:pic>
+    </p:spTree>
+    <p:extLst>
+      <p:ext uri="{BB962C8B-B14F-4D97-AF65-F5344CB8AC3E}">
+        <p14:creationId xmlns:p14="http://schemas.microsoft.com/office/powerpoint/2010/main" val="3611523215"/>
+      </p:ext>
+    </p:extLst>
+  </p:cSld>
+  <p:clrMapOvr>
+    <a:masterClrMapping/>
+  </p:clrMapOvr>
+</p:sld>
+</file>
+
+<file path=ppt/slides/slide16.xml><?xml version="1.0" encoding="utf-8"?>
+<p:sld xmlns:a="http://schemas.openxmlformats.org/drawingml/2006/main" xmlns:r="http://schemas.openxmlformats.org/officeDocument/2006/relationships" xmlns:p="http://schemas.openxmlformats.org/presentationml/2006/main">
+  <p:cSld>
+    <p:spTree>
+      <p:nvGrpSpPr>
+        <p:cNvPr id="1" name=""/>
+        <p:cNvGrpSpPr/>
+        <p:nvPr/>
+      </p:nvGrpSpPr>
+      <p:grpSpPr>
+        <a:xfrm>
+          <a:off x="0" y="0"/>
+          <a:ext cx="0" cy="0"/>
+          <a:chOff x="0" y="0"/>
+          <a:chExt cx="0" cy="0"/>
+        </a:xfrm>
+      </p:grpSpPr>
+      <p:sp>
+        <p:nvSpPr>
+          <p:cNvPr id="2" name="Title 1">
+            <a:extLst>
+              <a:ext uri="{FF2B5EF4-FFF2-40B4-BE49-F238E27FC236}">
+                <a16:creationId xmlns:a16="http://schemas.microsoft.com/office/drawing/2014/main" id="{974CF216-FDBE-43E5-BA1B-61AA552DE704}"/>
+              </a:ext>
+            </a:extLst>
+          </p:cNvPr>
+          <p:cNvSpPr>
+            <a:spLocks noGrp="1"/>
+          </p:cNvSpPr>
+          <p:nvPr>
+            <p:ph type="title"/>
+          </p:nvPr>
+        </p:nvSpPr>
+        <p:spPr>
+          <a:xfrm>
+            <a:off x="581192" y="702156"/>
+            <a:ext cx="11029616" cy="571059"/>
+          </a:xfrm>
+        </p:spPr>
+        <p:txBody>
+          <a:bodyPr/>
+          <a:lstStyle/>
+          <a:p>
+            <a:r>
+              <a:rPr lang="en-US" dirty="0"/>
+              <a:t>Profile claims are missing</a:t>
+            </a:r>
+          </a:p>
+        </p:txBody>
+      </p:sp>
+      <p:pic>
+        <p:nvPicPr>
+          <p:cNvPr id="4" name="Picture 3">
+            <a:extLst>
+              <a:ext uri="{FF2B5EF4-FFF2-40B4-BE49-F238E27FC236}">
+                <a16:creationId xmlns:a16="http://schemas.microsoft.com/office/drawing/2014/main" id="{56A1CF2F-C7D4-48CC-8443-6593C7610AF6}"/>
+              </a:ext>
+            </a:extLst>
+          </p:cNvPr>
+          <p:cNvPicPr>
+            <a:picLocks noChangeAspect="1"/>
+          </p:cNvPicPr>
+          <p:nvPr/>
+        </p:nvPicPr>
+        <p:blipFill>
+          <a:blip r:embed="rId2"/>
+          <a:stretch>
+            <a:fillRect/>
+          </a:stretch>
+        </p:blipFill>
+        <p:spPr>
+          <a:xfrm>
+            <a:off x="108411" y="1365813"/>
+            <a:ext cx="11975177" cy="5492187"/>
+          </a:xfrm>
+          <a:prstGeom prst="rect">
+            <a:avLst/>
+          </a:prstGeom>
+        </p:spPr>
+      </p:pic>
+    </p:spTree>
+    <p:extLst>
+      <p:ext uri="{BB962C8B-B14F-4D97-AF65-F5344CB8AC3E}">
+        <p14:creationId xmlns:p14="http://schemas.microsoft.com/office/powerpoint/2010/main" val="3373888267"/>
+      </p:ext>
+    </p:extLst>
+  </p:cSld>
+  <p:clrMapOvr>
+    <a:masterClrMapping/>
+  </p:clrMapOvr>
+</p:sld>
+</file>
+
+<file path=ppt/slides/slide17.xml><?xml version="1.0" encoding="utf-8"?>
+<p:sld xmlns:a="http://schemas.openxmlformats.org/drawingml/2006/main" xmlns:r="http://schemas.openxmlformats.org/officeDocument/2006/relationships" xmlns:p="http://schemas.openxmlformats.org/presentationml/2006/main">
+  <p:cSld>
+    <p:spTree>
+      <p:nvGrpSpPr>
+        <p:cNvPr id="1" name=""/>
+        <p:cNvGrpSpPr/>
+        <p:nvPr/>
+      </p:nvGrpSpPr>
+      <p:grpSpPr>
+        <a:xfrm>
+          <a:off x="0" y="0"/>
+          <a:ext cx="0" cy="0"/>
+          <a:chOff x="0" y="0"/>
+          <a:chExt cx="0" cy="0"/>
+        </a:xfrm>
+      </p:grpSpPr>
+      <p:sp>
+        <p:nvSpPr>
+          <p:cNvPr id="2" name="Title 1">
+            <a:extLst>
+              <a:ext uri="{FF2B5EF4-FFF2-40B4-BE49-F238E27FC236}">
+                <a16:creationId xmlns:a16="http://schemas.microsoft.com/office/drawing/2014/main" id="{D715241D-0F6D-4D98-8179-7A2F7C55AB59}"/>
+              </a:ext>
+            </a:extLst>
+          </p:cNvPr>
+          <p:cNvSpPr>
+            <a:spLocks noGrp="1"/>
+          </p:cNvSpPr>
+          <p:nvPr>
+            <p:ph type="title"/>
+          </p:nvPr>
+        </p:nvSpPr>
+        <p:spPr>
+          <a:xfrm>
+            <a:off x="581192" y="702156"/>
+            <a:ext cx="11029616" cy="478462"/>
+          </a:xfrm>
+        </p:spPr>
+        <p:txBody>
+          <a:bodyPr>
+            <a:normAutofit fontScale="90000"/>
+          </a:bodyPr>
+          <a:lstStyle/>
+          <a:p>
+            <a:r>
+              <a:rPr lang="en-US" dirty="0"/>
+              <a:t>Authorization code + PKCE</a:t>
+            </a:r>
+          </a:p>
+        </p:txBody>
+      </p:sp>
+      <p:pic>
+        <p:nvPicPr>
+          <p:cNvPr id="4" name="Picture 3">
+            <a:extLst>
+              <a:ext uri="{FF2B5EF4-FFF2-40B4-BE49-F238E27FC236}">
+                <a16:creationId xmlns:a16="http://schemas.microsoft.com/office/drawing/2014/main" id="{1ADB8E07-FA78-4D64-9DC2-4DD850ECB9C0}"/>
+              </a:ext>
+            </a:extLst>
+          </p:cNvPr>
+          <p:cNvPicPr>
+            <a:picLocks noChangeAspect="1"/>
+          </p:cNvPicPr>
+          <p:nvPr/>
+        </p:nvPicPr>
+        <p:blipFill>
+          <a:blip r:embed="rId2"/>
+          <a:stretch>
+            <a:fillRect/>
+          </a:stretch>
+        </p:blipFill>
+        <p:spPr>
+          <a:xfrm>
+            <a:off x="-126663" y="1180618"/>
+            <a:ext cx="10639673" cy="5677382"/>
+          </a:xfrm>
+          <a:prstGeom prst="rect">
+            <a:avLst/>
+          </a:prstGeom>
+        </p:spPr>
+      </p:pic>
+    </p:spTree>
+    <p:extLst>
+      <p:ext uri="{BB962C8B-B14F-4D97-AF65-F5344CB8AC3E}">
+        <p14:creationId xmlns:p14="http://schemas.microsoft.com/office/powerpoint/2010/main" val="725539611"/>
+      </p:ext>
+    </p:extLst>
+  </p:cSld>
+  <p:clrMapOvr>
+    <a:masterClrMapping/>
+  </p:clrMapOvr>
+</p:sld>
+</file>
+
+<file path=ppt/slides/slide18.xml><?xml version="1.0" encoding="utf-8"?>
+<p:sld xmlns:a="http://schemas.openxmlformats.org/drawingml/2006/main" xmlns:r="http://schemas.openxmlformats.org/officeDocument/2006/relationships" xmlns:p="http://schemas.openxmlformats.org/presentationml/2006/main">
+  <p:cSld>
+    <p:spTree>
+      <p:nvGrpSpPr>
+        <p:cNvPr id="1" name=""/>
+        <p:cNvGrpSpPr/>
+        <p:nvPr/>
+      </p:nvGrpSpPr>
+      <p:grpSpPr>
+        <a:xfrm>
+          <a:off x="0" y="0"/>
+          <a:ext cx="0" cy="0"/>
+          <a:chOff x="0" y="0"/>
+          <a:chExt cx="0" cy="0"/>
+        </a:xfrm>
+      </p:grpSpPr>
+      <p:sp>
+        <p:nvSpPr>
+          <p:cNvPr id="2" name="Title 1">
+            <a:extLst>
+              <a:ext uri="{FF2B5EF4-FFF2-40B4-BE49-F238E27FC236}">
+                <a16:creationId xmlns:a16="http://schemas.microsoft.com/office/drawing/2014/main" id="{9D96B58A-BA55-4973-A782-03C96EF7E706}"/>
+              </a:ext>
+            </a:extLst>
+          </p:cNvPr>
+          <p:cNvSpPr>
+            <a:spLocks noGrp="1"/>
+          </p:cNvSpPr>
+          <p:nvPr>
+            <p:ph type="title"/>
+          </p:nvPr>
+        </p:nvSpPr>
+        <p:spPr>
+          <a:xfrm>
+            <a:off x="581192" y="702156"/>
+            <a:ext cx="11029616" cy="571059"/>
+          </a:xfrm>
+        </p:spPr>
+        <p:txBody>
+          <a:bodyPr/>
+          <a:lstStyle/>
+          <a:p>
+            <a:r>
+              <a:rPr lang="en-US" dirty="0"/>
+              <a:t>Logging out of web application - 1</a:t>
+            </a:r>
+          </a:p>
+        </p:txBody>
+      </p:sp>
+      <p:pic>
+        <p:nvPicPr>
+          <p:cNvPr id="4" name="Picture 3">
+            <a:extLst>
+              <a:ext uri="{FF2B5EF4-FFF2-40B4-BE49-F238E27FC236}">
+                <a16:creationId xmlns:a16="http://schemas.microsoft.com/office/drawing/2014/main" id="{B9E9D016-9C6E-4E53-B253-BB734DA2EC7C}"/>
+              </a:ext>
+            </a:extLst>
+          </p:cNvPr>
+          <p:cNvPicPr>
+            <a:picLocks noChangeAspect="1"/>
+          </p:cNvPicPr>
+          <p:nvPr/>
+        </p:nvPicPr>
+        <p:blipFill>
+          <a:blip r:embed="rId2"/>
+          <a:stretch>
+            <a:fillRect/>
+          </a:stretch>
+        </p:blipFill>
+        <p:spPr>
+          <a:xfrm>
+            <a:off x="0" y="1234855"/>
+            <a:ext cx="12192000" cy="5623145"/>
+          </a:xfrm>
+          <a:prstGeom prst="rect">
+            <a:avLst/>
+          </a:prstGeom>
+        </p:spPr>
+      </p:pic>
+    </p:spTree>
+    <p:extLst>
+      <p:ext uri="{BB962C8B-B14F-4D97-AF65-F5344CB8AC3E}">
+        <p14:creationId xmlns:p14="http://schemas.microsoft.com/office/powerpoint/2010/main" val="3418826710"/>
+      </p:ext>
+    </p:extLst>
+  </p:cSld>
+  <p:clrMapOvr>
+    <a:masterClrMapping/>
+  </p:clrMapOvr>
+</p:sld>
+</file>
+
+<file path=ppt/slides/slide19.xml><?xml version="1.0" encoding="utf-8"?>
+<p:sld xmlns:a="http://schemas.openxmlformats.org/drawingml/2006/main" xmlns:r="http://schemas.openxmlformats.org/officeDocument/2006/relationships" xmlns:p="http://schemas.openxmlformats.org/presentationml/2006/main">
+  <p:cSld>
+    <p:spTree>
+      <p:nvGrpSpPr>
+        <p:cNvPr id="1" name=""/>
+        <p:cNvGrpSpPr/>
+        <p:nvPr/>
+      </p:nvGrpSpPr>
+      <p:grpSpPr>
+        <a:xfrm>
+          <a:off x="0" y="0"/>
+          <a:ext cx="0" cy="0"/>
+          <a:chOff x="0" y="0"/>
+          <a:chExt cx="0" cy="0"/>
+        </a:xfrm>
+      </p:grpSpPr>
+      <p:sp>
+        <p:nvSpPr>
+          <p:cNvPr id="2" name="Title 1">
+            <a:extLst>
+              <a:ext uri="{FF2B5EF4-FFF2-40B4-BE49-F238E27FC236}">
+                <a16:creationId xmlns:a16="http://schemas.microsoft.com/office/drawing/2014/main" id="{9D96B58A-BA55-4973-A782-03C96EF7E706}"/>
+              </a:ext>
+            </a:extLst>
+          </p:cNvPr>
+          <p:cNvSpPr>
+            <a:spLocks noGrp="1"/>
+          </p:cNvSpPr>
+          <p:nvPr>
+            <p:ph type="title"/>
+          </p:nvPr>
+        </p:nvSpPr>
+        <p:spPr>
+          <a:xfrm>
+            <a:off x="581192" y="702156"/>
+            <a:ext cx="11029616" cy="571059"/>
+          </a:xfrm>
+        </p:spPr>
+        <p:txBody>
+          <a:bodyPr/>
+          <a:lstStyle/>
+          <a:p>
+            <a:r>
+              <a:rPr lang="en-US" dirty="0"/>
+              <a:t>Logging out of web application -2 – Empty page</a:t>
+            </a:r>
+          </a:p>
+        </p:txBody>
+      </p:sp>
+      <p:pic>
+        <p:nvPicPr>
+          <p:cNvPr id="3" name="Picture 2">
+            <a:extLst>
+              <a:ext uri="{FF2B5EF4-FFF2-40B4-BE49-F238E27FC236}">
+                <a16:creationId xmlns:a16="http://schemas.microsoft.com/office/drawing/2014/main" id="{A81BDE4A-758D-4CF0-92A6-74CF617FDA62}"/>
+              </a:ext>
+            </a:extLst>
+          </p:cNvPr>
+          <p:cNvPicPr>
+            <a:picLocks noChangeAspect="1"/>
+          </p:cNvPicPr>
+          <p:nvPr/>
+        </p:nvPicPr>
+        <p:blipFill>
+          <a:blip r:embed="rId2"/>
+          <a:stretch>
+            <a:fillRect/>
+          </a:stretch>
+        </p:blipFill>
+        <p:spPr>
+          <a:xfrm>
+            <a:off x="768872" y="1343025"/>
+            <a:ext cx="9010650" cy="4171950"/>
+          </a:xfrm>
+          <a:prstGeom prst="rect">
+            <a:avLst/>
+          </a:prstGeom>
+        </p:spPr>
+      </p:pic>
+    </p:spTree>
+    <p:extLst>
+      <p:ext uri="{BB962C8B-B14F-4D97-AF65-F5344CB8AC3E}">
+        <p14:creationId xmlns:p14="http://schemas.microsoft.com/office/powerpoint/2010/main" val="703694619"/>
+      </p:ext>
+    </p:extLst>
+  </p:cSld>
+  <p:clrMapOvr>
+    <a:masterClrMapping/>
+  </p:clrMapOvr>
+</p:sld>
+</file>
+
 <file path=ppt/slides/slide2.xml><?xml version="1.0" encoding="utf-8"?>
 <p:sld xmlns:a="http://schemas.openxmlformats.org/drawingml/2006/main" xmlns:r="http://schemas.openxmlformats.org/officeDocument/2006/relationships" xmlns:p="http://schemas.openxmlformats.org/presentationml/2006/main">
   <p:cSld>
@@ -4791,6 +5613,224 @@
     <p:extLst>
       <p:ext uri="{BB962C8B-B14F-4D97-AF65-F5344CB8AC3E}">
         <p14:creationId xmlns:p14="http://schemas.microsoft.com/office/powerpoint/2010/main" val="969402455"/>
+      </p:ext>
+    </p:extLst>
+  </p:cSld>
+  <p:clrMapOvr>
+    <a:masterClrMapping/>
+  </p:clrMapOvr>
+</p:sld>
+</file>
+
+<file path=ppt/slides/slide20.xml><?xml version="1.0" encoding="utf-8"?>
+<p:sld xmlns:a="http://schemas.openxmlformats.org/drawingml/2006/main" xmlns:r="http://schemas.openxmlformats.org/officeDocument/2006/relationships" xmlns:p="http://schemas.openxmlformats.org/presentationml/2006/main">
+  <p:cSld>
+    <p:spTree>
+      <p:nvGrpSpPr>
+        <p:cNvPr id="1" name=""/>
+        <p:cNvGrpSpPr/>
+        <p:nvPr/>
+      </p:nvGrpSpPr>
+      <p:grpSpPr>
+        <a:xfrm>
+          <a:off x="0" y="0"/>
+          <a:ext cx="0" cy="0"/>
+          <a:chOff x="0" y="0"/>
+          <a:chExt cx="0" cy="0"/>
+        </a:xfrm>
+      </p:grpSpPr>
+      <p:sp>
+        <p:nvSpPr>
+          <p:cNvPr id="2" name="Title 1">
+            <a:extLst>
+              <a:ext uri="{FF2B5EF4-FFF2-40B4-BE49-F238E27FC236}">
+                <a16:creationId xmlns:a16="http://schemas.microsoft.com/office/drawing/2014/main" id="{BB99D6F5-3A7A-43FD-97ED-4B7A058537FE}"/>
+              </a:ext>
+            </a:extLst>
+          </p:cNvPr>
+          <p:cNvSpPr>
+            <a:spLocks noGrp="1"/>
+          </p:cNvSpPr>
+          <p:nvPr>
+            <p:ph type="title"/>
+          </p:nvPr>
+        </p:nvSpPr>
+        <p:spPr>
+          <a:xfrm>
+            <a:off x="581192" y="702156"/>
+            <a:ext cx="11029616" cy="605783"/>
+          </a:xfrm>
+        </p:spPr>
+        <p:txBody>
+          <a:bodyPr/>
+          <a:lstStyle/>
+          <a:p>
+            <a:r>
+              <a:rPr lang="en-US" dirty="0"/>
+              <a:t>Log out of identity provider</a:t>
+            </a:r>
+          </a:p>
+        </p:txBody>
+      </p:sp>
+      <p:pic>
+        <p:nvPicPr>
+          <p:cNvPr id="4" name="Picture 3">
+            <a:extLst>
+              <a:ext uri="{FF2B5EF4-FFF2-40B4-BE49-F238E27FC236}">
+                <a16:creationId xmlns:a16="http://schemas.microsoft.com/office/drawing/2014/main" id="{F2C3C506-5E7B-4F6D-A721-F1CC189B25D5}"/>
+              </a:ext>
+            </a:extLst>
+          </p:cNvPr>
+          <p:cNvPicPr>
+            <a:picLocks noChangeAspect="1"/>
+          </p:cNvPicPr>
+          <p:nvPr/>
+        </p:nvPicPr>
+        <p:blipFill>
+          <a:blip r:embed="rId2"/>
+          <a:stretch>
+            <a:fillRect/>
+          </a:stretch>
+        </p:blipFill>
+        <p:spPr>
+          <a:xfrm>
+            <a:off x="800100" y="2095500"/>
+            <a:ext cx="10591800" cy="2667000"/>
+          </a:xfrm>
+          <a:prstGeom prst="rect">
+            <a:avLst/>
+          </a:prstGeom>
+        </p:spPr>
+      </p:pic>
+    </p:spTree>
+    <p:extLst>
+      <p:ext uri="{BB962C8B-B14F-4D97-AF65-F5344CB8AC3E}">
+        <p14:creationId xmlns:p14="http://schemas.microsoft.com/office/powerpoint/2010/main" val="817713195"/>
+      </p:ext>
+    </p:extLst>
+  </p:cSld>
+  <p:clrMapOvr>
+    <a:masterClrMapping/>
+  </p:clrMapOvr>
+</p:sld>
+</file>
+
+<file path=ppt/slides/slide21.xml><?xml version="1.0" encoding="utf-8"?>
+<p:sld xmlns:a="http://schemas.openxmlformats.org/drawingml/2006/main" xmlns:r="http://schemas.openxmlformats.org/officeDocument/2006/relationships" xmlns:p="http://schemas.openxmlformats.org/presentationml/2006/main">
+  <p:cSld>
+    <p:spTree>
+      <p:nvGrpSpPr>
+        <p:cNvPr id="1" name=""/>
+        <p:cNvGrpSpPr/>
+        <p:nvPr/>
+      </p:nvGrpSpPr>
+      <p:grpSpPr>
+        <a:xfrm>
+          <a:off x="0" y="0"/>
+          <a:ext cx="0" cy="0"/>
+          <a:chOff x="0" y="0"/>
+          <a:chExt cx="0" cy="0"/>
+        </a:xfrm>
+      </p:grpSpPr>
+      <p:sp>
+        <p:nvSpPr>
+          <p:cNvPr id="2" name="Title 1">
+            <a:extLst>
+              <a:ext uri="{FF2B5EF4-FFF2-40B4-BE49-F238E27FC236}">
+                <a16:creationId xmlns:a16="http://schemas.microsoft.com/office/drawing/2014/main" id="{42FDE62A-8B2C-47F6-BFE4-855BF711BA18}"/>
+              </a:ext>
+            </a:extLst>
+          </p:cNvPr>
+          <p:cNvSpPr>
+            <a:spLocks noGrp="1"/>
+          </p:cNvSpPr>
+          <p:nvPr>
+            <p:ph type="title"/>
+          </p:nvPr>
+        </p:nvSpPr>
+        <p:spPr>
+          <a:xfrm>
+            <a:off x="581192" y="702156"/>
+            <a:ext cx="11029616" cy="409014"/>
+          </a:xfrm>
+        </p:spPr>
+        <p:txBody>
+          <a:bodyPr>
+            <a:normAutofit fontScale="90000"/>
+          </a:bodyPr>
+          <a:lstStyle/>
+          <a:p>
+            <a:r>
+              <a:rPr lang="en-US" dirty="0"/>
+              <a:t>Redirect after logout</a:t>
+            </a:r>
+          </a:p>
+        </p:txBody>
+      </p:sp>
+      <p:pic>
+        <p:nvPicPr>
+          <p:cNvPr id="4" name="Picture 3">
+            <a:extLst>
+              <a:ext uri="{FF2B5EF4-FFF2-40B4-BE49-F238E27FC236}">
+                <a16:creationId xmlns:a16="http://schemas.microsoft.com/office/drawing/2014/main" id="{1F84DB8D-9629-4561-A5F3-1321DB80D7C0}"/>
+              </a:ext>
+            </a:extLst>
+          </p:cNvPr>
+          <p:cNvPicPr>
+            <a:picLocks noChangeAspect="1"/>
+          </p:cNvPicPr>
+          <p:nvPr/>
+        </p:nvPicPr>
+        <p:blipFill>
+          <a:blip r:embed="rId2"/>
+          <a:stretch>
+            <a:fillRect/>
+          </a:stretch>
+        </p:blipFill>
+        <p:spPr>
+          <a:xfrm>
+            <a:off x="0" y="1111170"/>
+            <a:ext cx="10877550" cy="2486025"/>
+          </a:xfrm>
+          <a:prstGeom prst="rect">
+            <a:avLst/>
+          </a:prstGeom>
+        </p:spPr>
+      </p:pic>
+      <p:pic>
+        <p:nvPicPr>
+          <p:cNvPr id="5" name="Picture 4">
+            <a:extLst>
+              <a:ext uri="{FF2B5EF4-FFF2-40B4-BE49-F238E27FC236}">
+                <a16:creationId xmlns:a16="http://schemas.microsoft.com/office/drawing/2014/main" id="{4E01131B-1D2B-4351-BB1F-7CEB7CF12A49}"/>
+              </a:ext>
+            </a:extLst>
+          </p:cNvPr>
+          <p:cNvPicPr>
+            <a:picLocks noChangeAspect="1"/>
+          </p:cNvPicPr>
+          <p:nvPr/>
+        </p:nvPicPr>
+        <p:blipFill>
+          <a:blip r:embed="rId3"/>
+          <a:stretch>
+            <a:fillRect/>
+          </a:stretch>
+        </p:blipFill>
+        <p:spPr>
+          <a:xfrm>
+            <a:off x="0" y="3877519"/>
+            <a:ext cx="11925300" cy="2980481"/>
+          </a:xfrm>
+          <a:prstGeom prst="rect">
+            <a:avLst/>
+          </a:prstGeom>
+        </p:spPr>
+      </p:pic>
+    </p:spTree>
+    <p:extLst>
+      <p:ext uri="{BB962C8B-B14F-4D97-AF65-F5344CB8AC3E}">
+        <p14:creationId xmlns:p14="http://schemas.microsoft.com/office/powerpoint/2010/main" val="2635601217"/>
       </p:ext>
     </p:extLst>
   </p:cSld>
@@ -6142,6 +7182,14 @@
 </file>
 
 <file path=customXml/item1.xml><?xml version="1.0" encoding="utf-8"?>
+<p:properties xmlns:p="http://schemas.microsoft.com/office/2006/metadata/properties" xmlns:xsi="http://www.w3.org/2001/XMLSchema-instance" xmlns:pc="http://schemas.microsoft.com/office/infopath/2007/PartnerControls">
+  <documentManagement>
+    <MediaServiceKeyPoints xmlns="202358ec-179a-408b-b7b5-a044911a4b9d" xsi:nil="true"/>
+  </documentManagement>
+</p:properties>
+</file>
+
+<file path=customXml/item2.xml><?xml version="1.0" encoding="utf-8"?>
 <ct:contentTypeSchema xmlns:ct="http://schemas.microsoft.com/office/2006/metadata/contentType" xmlns:ma="http://schemas.microsoft.com/office/2006/metadata/properties/metaAttributes" ct:_="" ma:_="" ma:contentTypeName="Document" ma:contentTypeID="0x010100FCDB438EAC94924B920680F565C2EAFC" ma:contentTypeVersion="13" ma:contentTypeDescription="Create a new document." ma:contentTypeScope="" ma:versionID="e54cca1f4f0be5afd0796b168a64d0ae">
   <xsd:schema xmlns:xsd="http://www.w3.org/2001/XMLSchema" xmlns:xs="http://www.w3.org/2001/XMLSchema" xmlns:p="http://schemas.microsoft.com/office/2006/metadata/properties" xmlns:ns3="202358ec-179a-408b-b7b5-a044911a4b9d" xmlns:ns4="c259813f-1519-4b54-bad6-e01c4fa9220c" targetNamespace="http://schemas.microsoft.com/office/2006/metadata/properties" ma:root="true" ma:fieldsID="de09b3765c4669d39f7417c6411f815b" ns3:_="" ns4:_="">
     <xsd:import namespace="202358ec-179a-408b-b7b5-a044911a4b9d"/>
@@ -6364,7 +7412,7 @@
 </ct:contentTypeSchema>
 </file>
 
-<file path=customXml/item2.xml><?xml version="1.0" encoding="utf-8"?>
+<file path=customXml/item3.xml><?xml version="1.0" encoding="utf-8"?>
 <?mso-contentType ?>
 <FormTemplates xmlns="http://schemas.microsoft.com/sharepoint/v3/contenttype/forms">
   <Display>DocumentLibraryForm</Display>
@@ -6373,15 +7421,24 @@
 </FormTemplates>
 </file>
 
-<file path=customXml/item3.xml><?xml version="1.0" encoding="utf-8"?>
-<p:properties xmlns:p="http://schemas.microsoft.com/office/2006/metadata/properties" xmlns:xsi="http://www.w3.org/2001/XMLSchema-instance" xmlns:pc="http://schemas.microsoft.com/office/infopath/2007/PartnerControls">
-  <documentManagement>
-    <MediaServiceKeyPoints xmlns="202358ec-179a-408b-b7b5-a044911a4b9d" xsi:nil="true"/>
-  </documentManagement>
-</p:properties>
+<file path=customXml/itemProps1.xml><?xml version="1.0" encoding="utf-8"?>
+<ds:datastoreItem xmlns:ds="http://schemas.openxmlformats.org/officeDocument/2006/customXml" ds:itemID="{8D289AE2-D2AE-49D1-AFAC-3A79F6794255}">
+  <ds:schemaRefs>
+    <ds:schemaRef ds:uri="http://schemas.microsoft.com/office/2006/metadata/properties"/>
+    <ds:schemaRef ds:uri="http://purl.org/dc/terms/"/>
+    <ds:schemaRef ds:uri="c259813f-1519-4b54-bad6-e01c4fa9220c"/>
+    <ds:schemaRef ds:uri="http://schemas.openxmlformats.org/package/2006/metadata/core-properties"/>
+    <ds:schemaRef ds:uri="http://schemas.microsoft.com/office/2006/documentManagement/types"/>
+    <ds:schemaRef ds:uri="http://schemas.microsoft.com/office/infopath/2007/PartnerControls"/>
+    <ds:schemaRef ds:uri="http://purl.org/dc/elements/1.1/"/>
+    <ds:schemaRef ds:uri="202358ec-179a-408b-b7b5-a044911a4b9d"/>
+    <ds:schemaRef ds:uri="http://www.w3.org/XML/1998/namespace"/>
+    <ds:schemaRef ds:uri="http://purl.org/dc/dcmitype/"/>
+  </ds:schemaRefs>
+</ds:datastoreItem>
 </file>
 
-<file path=customXml/itemProps1.xml><?xml version="1.0" encoding="utf-8"?>
+<file path=customXml/itemProps2.xml><?xml version="1.0" encoding="utf-8"?>
 <ds:datastoreItem xmlns:ds="http://schemas.openxmlformats.org/officeDocument/2006/customXml" ds:itemID="{926E7521-10F3-4296-BF85-2F6D0232C422}">
   <ds:schemaRefs>
     <ds:schemaRef ds:uri="http://schemas.microsoft.com/office/2006/metadata/contentType"/>
@@ -6400,27 +7457,10 @@
 </ds:datastoreItem>
 </file>
 
-<file path=customXml/itemProps2.xml><?xml version="1.0" encoding="utf-8"?>
+<file path=customXml/itemProps3.xml><?xml version="1.0" encoding="utf-8"?>
 <ds:datastoreItem xmlns:ds="http://schemas.openxmlformats.org/officeDocument/2006/customXml" ds:itemID="{927BD4C1-B6B1-4715-ABF9-E660A51A4EA0}">
   <ds:schemaRefs>
     <ds:schemaRef ds:uri="http://schemas.microsoft.com/sharepoint/v3/contenttype/forms"/>
   </ds:schemaRefs>
 </ds:datastoreItem>
-</file>
-
-<file path=customXml/itemProps3.xml><?xml version="1.0" encoding="utf-8"?>
-<ds:datastoreItem xmlns:ds="http://schemas.openxmlformats.org/officeDocument/2006/customXml" ds:itemID="{8D289AE2-D2AE-49D1-AFAC-3A79F6794255}">
-  <ds:schemaRefs>
-    <ds:schemaRef ds:uri="http://schemas.microsoft.com/office/2006/metadata/properties"/>
-    <ds:schemaRef ds:uri="http://purl.org/dc/terms/"/>
-    <ds:schemaRef ds:uri="c259813f-1519-4b54-bad6-e01c4fa9220c"/>
-    <ds:schemaRef ds:uri="http://schemas.openxmlformats.org/package/2006/metadata/core-properties"/>
-    <ds:schemaRef ds:uri="http://schemas.microsoft.com/office/2006/documentManagement/types"/>
-    <ds:schemaRef ds:uri="http://schemas.microsoft.com/office/infopath/2007/PartnerControls"/>
-    <ds:schemaRef ds:uri="http://purl.org/dc/elements/1.1/"/>
-    <ds:schemaRef ds:uri="202358ec-179a-408b-b7b5-a044911a4b9d"/>
-    <ds:schemaRef ds:uri="http://www.w3.org/XML/1998/namespace"/>
-    <ds:schemaRef ds:uri="http://purl.org/dc/dcmitype/"/>
-  </ds:schemaRefs>
-</ds:datastoreItem>
 </file>
</xml_diff>